<commit_message>
Cambios en la memoria
</commit_message>
<xml_diff>
--- a/Presentacion/Presentación.pptx
+++ b/Presentacion/Presentación.pptx
@@ -5891,14 +5891,6 @@
               </a:rPr>
               <a:t>objetivos</a:t>
             </a:r>
-            <a:endParaRPr lang="es-ES" sz="4800" dirty="0">
-              <a:solidFill>
-                <a:srgbClr val="404040"/>
-              </a:solidFill>
-              <a:latin typeface="Tw Cen MT" panose="020B0602020104020603" pitchFamily="34" charset="0"/>
-              <a:ea typeface="+mn-ea"/>
-              <a:cs typeface="+mn-cs"/>
-            </a:endParaRPr>
           </a:p>
         </p:txBody>
       </p:sp>
@@ -9050,38 +9042,8 @@
                 <a:ea typeface="+mn-ea"/>
                 <a:cs typeface="+mn-cs"/>
               </a:rPr>
-              <a:t>Datos </a:t>
+              <a:t>Datos de 2020</a:t>
             </a:r>
-            <a:r>
-              <a:rPr lang="es-ES" sz="4800" dirty="0">
-                <a:solidFill>
-                  <a:srgbClr val="404040"/>
-                </a:solidFill>
-                <a:latin typeface="Tw Cen MT" panose="020B0602020104020603" pitchFamily="34" charset="0"/>
-                <a:ea typeface="+mn-ea"/>
-                <a:cs typeface="+mn-cs"/>
-              </a:rPr>
-              <a:t>de</a:t>
-            </a:r>
-            <a:r>
-              <a:rPr lang="es-ES" sz="4800" dirty="0">
-                <a:solidFill>
-                  <a:srgbClr val="404040"/>
-                </a:solidFill>
-                <a:latin typeface="Tw Cen MT" panose="020B0602020104020603" pitchFamily="34" charset="0"/>
-                <a:ea typeface="+mn-ea"/>
-                <a:cs typeface="+mn-cs"/>
-              </a:rPr>
-              <a:t> 2020</a:t>
-            </a:r>
-            <a:endParaRPr lang="es-ES" sz="4800" dirty="0">
-              <a:solidFill>
-                <a:srgbClr val="404040"/>
-              </a:solidFill>
-              <a:latin typeface="Tw Cen MT" panose="020B0602020104020603" pitchFamily="34" charset="0"/>
-              <a:ea typeface="+mn-ea"/>
-              <a:cs typeface="+mn-cs"/>
-            </a:endParaRPr>
           </a:p>
         </p:txBody>
       </p:sp>
@@ -23117,13 +23079,13 @@
   <p:clrMapOvr>
     <a:masterClrMapping/>
   </p:clrMapOvr>
-  <mc:AlternateContent xmlns:mc="http://schemas.openxmlformats.org/markup-compatibility/2006">
-    <mc:Choice xmlns:p14="http://schemas.microsoft.com/office/powerpoint/2010/main" Requires="p14">
+  <mc:AlternateContent xmlns:mc="http://schemas.openxmlformats.org/markup-compatibility/2006" xmlns:p14="http://schemas.microsoft.com/office/powerpoint/2010/main">
+    <mc:Choice Requires="p14">
       <p:transition spd="slow" p14:dur="1300">
         <p14:pan dir="u"/>
       </p:transition>
     </mc:Choice>
-    <mc:Fallback>
+    <mc:Fallback xmlns="">
       <p:transition spd="slow">
         <p:fade/>
       </p:transition>
@@ -23538,7 +23500,7 @@
               <a:r>
                 <a:rPr lang="es-ES" sz="3200" b="1" dirty="0" smtClean="0">
                   <a:solidFill>
-                    <a:schemeClr val="bg2"/>
+                    <a:schemeClr val="bg1"/>
                   </a:solidFill>
                   <a:latin typeface="+mj-lt"/>
                 </a:rPr>
@@ -23546,7 +23508,7 @@
               </a:r>
               <a:endParaRPr lang="es-ES" sz="3200" b="1" dirty="0">
                 <a:solidFill>
-                  <a:schemeClr val="bg2"/>
+                  <a:schemeClr val="bg1"/>
                 </a:solidFill>
                 <a:latin typeface="+mj-lt"/>
               </a:endParaRPr>
@@ -23584,7 +23546,7 @@
               <a:r>
                 <a:rPr lang="es-ES" sz="1600" dirty="0" smtClean="0">
                   <a:solidFill>
-                    <a:schemeClr val="bg2"/>
+                    <a:schemeClr val="bg1"/>
                   </a:solidFill>
                   <a:latin typeface="+mj-lt"/>
                 </a:rPr>
@@ -23592,7 +23554,7 @@
               </a:r>
               <a:endParaRPr lang="es-ES" sz="1600" dirty="0">
                 <a:solidFill>
-                  <a:schemeClr val="bg2"/>
+                  <a:schemeClr val="bg1"/>
                 </a:solidFill>
                 <a:latin typeface="+mj-lt"/>
               </a:endParaRPr>
@@ -23968,9 +23930,7 @@
             </a:pathLst>
           </a:custGeom>
           <a:solidFill>
-            <a:schemeClr val="bg1">
-              <a:lumMod val="95000"/>
-            </a:schemeClr>
+            <a:schemeClr val="bg1"/>
           </a:solidFill>
           <a:ln>
             <a:noFill/>
@@ -24484,9 +24444,7 @@
                 </a:pathLst>
               </a:custGeom>
               <a:solidFill>
-                <a:schemeClr val="bg1">
-                  <a:lumMod val="95000"/>
-                </a:schemeClr>
+                <a:schemeClr val="bg1"/>
               </a:solidFill>
               <a:ln>
                 <a:noFill/>
@@ -24794,7 +24752,7 @@
               <a:r>
                 <a:rPr lang="en-US" sz="3200" b="1" dirty="0" smtClean="0">
                   <a:solidFill>
-                    <a:schemeClr val="bg2"/>
+                    <a:schemeClr val="bg1"/>
                   </a:solidFill>
                   <a:latin typeface="+mj-lt"/>
                 </a:rPr>
@@ -24802,7 +24760,7 @@
               </a:r>
               <a:endParaRPr lang="en-US" sz="3200" b="1" dirty="0">
                 <a:solidFill>
-                  <a:schemeClr val="bg2"/>
+                  <a:schemeClr val="bg1"/>
                 </a:solidFill>
                 <a:latin typeface="+mj-lt"/>
               </a:endParaRPr>
@@ -24840,7 +24798,7 @@
               <a:r>
                 <a:rPr lang="en-US" sz="1600" dirty="0" smtClean="0">
                   <a:solidFill>
-                    <a:schemeClr val="bg2"/>
+                    <a:schemeClr val="bg1"/>
                   </a:solidFill>
                   <a:latin typeface="+mj-lt"/>
                 </a:rPr>
@@ -24849,7 +24807,7 @@
               <a:r>
                 <a:rPr lang="es-ES" sz="1600" dirty="0" smtClean="0">
                   <a:solidFill>
-                    <a:schemeClr val="bg2"/>
+                    <a:schemeClr val="bg1"/>
                   </a:solidFill>
                   <a:latin typeface="+mj-lt"/>
                 </a:rPr>
@@ -24858,7 +24816,7 @@
               <a:r>
                 <a:rPr lang="en-US" sz="1600" dirty="0" smtClean="0">
                   <a:solidFill>
-                    <a:schemeClr val="bg2"/>
+                    <a:schemeClr val="bg1"/>
                   </a:solidFill>
                   <a:latin typeface="+mj-lt"/>
                 </a:rPr>
@@ -24867,7 +24825,7 @@
               <a:r>
                 <a:rPr lang="es-ES" sz="1600" dirty="0" smtClean="0">
                   <a:solidFill>
-                    <a:schemeClr val="bg2"/>
+                    <a:schemeClr val="bg1"/>
                   </a:solidFill>
                   <a:latin typeface="+mj-lt"/>
                 </a:rPr>
@@ -24876,7 +24834,7 @@
               <a:r>
                 <a:rPr lang="en-US" sz="1600" dirty="0" smtClean="0">
                   <a:solidFill>
-                    <a:schemeClr val="bg2"/>
+                    <a:schemeClr val="bg1"/>
                   </a:solidFill>
                   <a:latin typeface="+mj-lt"/>
                 </a:rPr>
@@ -24885,7 +24843,7 @@
               <a:r>
                 <a:rPr lang="es-ES" sz="1600" dirty="0" smtClean="0">
                   <a:solidFill>
-                    <a:schemeClr val="bg2"/>
+                    <a:schemeClr val="bg1"/>
                   </a:solidFill>
                   <a:latin typeface="+mj-lt"/>
                 </a:rPr>
@@ -24894,7 +24852,7 @@
               <a:r>
                 <a:rPr lang="en-US" sz="1600" dirty="0" smtClean="0">
                   <a:solidFill>
-                    <a:schemeClr val="bg2"/>
+                    <a:schemeClr val="bg1"/>
                   </a:solidFill>
                   <a:latin typeface="+mj-lt"/>
                 </a:rPr>
@@ -24903,7 +24861,7 @@
               <a:r>
                 <a:rPr lang="es-ES" sz="1600" dirty="0" smtClean="0">
                   <a:solidFill>
-                    <a:schemeClr val="bg2"/>
+                    <a:schemeClr val="bg1"/>
                   </a:solidFill>
                   <a:latin typeface="+mj-lt"/>
                 </a:rPr>
@@ -24912,7 +24870,7 @@
               <a:r>
                 <a:rPr lang="en-US" sz="1600" dirty="0" smtClean="0">
                   <a:solidFill>
-                    <a:schemeClr val="bg2"/>
+                    <a:schemeClr val="bg1"/>
                   </a:solidFill>
                   <a:latin typeface="+mj-lt"/>
                 </a:rPr>
@@ -24920,7 +24878,7 @@
               </a:r>
               <a:endParaRPr lang="en-US" sz="1600" dirty="0">
                 <a:solidFill>
-                  <a:schemeClr val="bg2"/>
+                  <a:schemeClr val="bg1"/>
                 </a:solidFill>
                 <a:latin typeface="+mj-lt"/>
               </a:endParaRPr>
@@ -25507,9 +25465,7 @@
                 </a:pathLst>
               </a:custGeom>
               <a:solidFill>
-                <a:schemeClr val="bg1">
-                  <a:lumMod val="95000"/>
-                </a:schemeClr>
+                <a:schemeClr val="bg1"/>
               </a:solidFill>
               <a:ln>
                 <a:noFill/>
@@ -25993,7 +25949,7 @@
               <a:r>
                 <a:rPr lang="en-US" sz="3200" b="1" dirty="0" smtClean="0">
                   <a:solidFill>
-                    <a:schemeClr val="bg2"/>
+                    <a:schemeClr val="bg1"/>
                   </a:solidFill>
                   <a:latin typeface="+mj-lt"/>
                 </a:rPr>
@@ -26001,7 +25957,7 @@
               </a:r>
               <a:endParaRPr lang="en-US" sz="3200" b="1" dirty="0">
                 <a:solidFill>
-                  <a:schemeClr val="bg2"/>
+                  <a:schemeClr val="bg1"/>
                 </a:solidFill>
                 <a:latin typeface="+mj-lt"/>
               </a:endParaRPr>
@@ -26039,7 +25995,7 @@
               <a:r>
                 <a:rPr lang="es-ES" sz="1600" dirty="0" smtClean="0">
                   <a:solidFill>
-                    <a:schemeClr val="bg2"/>
+                    <a:schemeClr val="bg1"/>
                   </a:solidFill>
                   <a:latin typeface="+mj-lt"/>
                 </a:rPr>
@@ -26047,7 +26003,7 @@
               </a:r>
               <a:endParaRPr lang="es-ES" sz="1600" dirty="0">
                 <a:solidFill>
-                  <a:schemeClr val="bg2"/>
+                  <a:schemeClr val="bg1"/>
                 </a:solidFill>
                 <a:latin typeface="+mj-lt"/>
               </a:endParaRPr>

</xml_diff>